<commit_message>
añadiendo figuras al apartado de desarollo
</commit_message>
<xml_diff>
--- a/memoria/Actualizaciones/presentcion controladores.pptx
+++ b/memoria/Actualizaciones/presentcion controladores.pptx
@@ -6,25 +6,18 @@
   </p:sldMasterIdLst>
   <p:sldIdLst>
     <p:sldId id="257" r:id="rId2"/>
-    <p:sldId id="270" r:id="rId3"/>
-    <p:sldId id="274" r:id="rId4"/>
-    <p:sldId id="272" r:id="rId5"/>
-    <p:sldId id="275" r:id="rId6"/>
-    <p:sldId id="273" r:id="rId7"/>
-    <p:sldId id="276" r:id="rId8"/>
-    <p:sldId id="271" r:id="rId9"/>
-    <p:sldId id="269" r:id="rId10"/>
-    <p:sldId id="267" r:id="rId11"/>
-    <p:sldId id="258" r:id="rId12"/>
-    <p:sldId id="268" r:id="rId13"/>
-    <p:sldId id="259" r:id="rId14"/>
-    <p:sldId id="260" r:id="rId15"/>
-    <p:sldId id="261" r:id="rId16"/>
-    <p:sldId id="262" r:id="rId17"/>
-    <p:sldId id="266" r:id="rId18"/>
-    <p:sldId id="263" r:id="rId19"/>
-    <p:sldId id="264" r:id="rId20"/>
-    <p:sldId id="265" r:id="rId21"/>
+    <p:sldId id="269" r:id="rId3"/>
+    <p:sldId id="271" r:id="rId4"/>
+    <p:sldId id="267" r:id="rId5"/>
+    <p:sldId id="268" r:id="rId6"/>
+    <p:sldId id="259" r:id="rId7"/>
+    <p:sldId id="260" r:id="rId8"/>
+    <p:sldId id="261" r:id="rId9"/>
+    <p:sldId id="262" r:id="rId10"/>
+    <p:sldId id="266" r:id="rId11"/>
+    <p:sldId id="263" r:id="rId12"/>
+    <p:sldId id="264" r:id="rId13"/>
+    <p:sldId id="265" r:id="rId14"/>
   </p:sldIdLst>
   <p:sldSz cx="12192000" cy="6858000"/>
   <p:notesSz cx="6858000" cy="9144000"/>
@@ -123,6 +116,11 @@
       </a:defRPr>
     </a:lvl9pPr>
   </p:defaultTextStyle>
+  <p:extLst>
+    <p:ext uri="{EFAFB233-063F-42B5-8137-9DF3F51BA10A}">
+      <p15:sldGuideLst xmlns:p15="http://schemas.microsoft.com/office/powerpoint/2012/main"/>
+    </p:ext>
+  </p:extLst>
 </p:presentation>
 </file>
 
@@ -273,7 +271,7 @@
           <a:p>
             <a:fld id="{7B9DECDD-3A1C-458C-A44B-DAA273418DF6}" type="datetimeFigureOut">
               <a:rPr lang="es-ES" smtClean="0"/>
-              <a:t>13/12/2022</a:t>
+              <a:t>10/01/2023</a:t>
             </a:fld>
             <a:endParaRPr lang="es-ES"/>
           </a:p>
@@ -471,7 +469,7 @@
           <a:p>
             <a:fld id="{7B9DECDD-3A1C-458C-A44B-DAA273418DF6}" type="datetimeFigureOut">
               <a:rPr lang="es-ES" smtClean="0"/>
-              <a:t>13/12/2022</a:t>
+              <a:t>10/01/2023</a:t>
             </a:fld>
             <a:endParaRPr lang="es-ES"/>
           </a:p>
@@ -679,7 +677,7 @@
           <a:p>
             <a:fld id="{7B9DECDD-3A1C-458C-A44B-DAA273418DF6}" type="datetimeFigureOut">
               <a:rPr lang="es-ES" smtClean="0"/>
-              <a:t>13/12/2022</a:t>
+              <a:t>10/01/2023</a:t>
             </a:fld>
             <a:endParaRPr lang="es-ES"/>
           </a:p>
@@ -877,7 +875,7 @@
           <a:p>
             <a:fld id="{7B9DECDD-3A1C-458C-A44B-DAA273418DF6}" type="datetimeFigureOut">
               <a:rPr lang="es-ES" smtClean="0"/>
-              <a:t>13/12/2022</a:t>
+              <a:t>10/01/2023</a:t>
             </a:fld>
             <a:endParaRPr lang="es-ES"/>
           </a:p>
@@ -1152,7 +1150,7 @@
           <a:p>
             <a:fld id="{7B9DECDD-3A1C-458C-A44B-DAA273418DF6}" type="datetimeFigureOut">
               <a:rPr lang="es-ES" smtClean="0"/>
-              <a:t>13/12/2022</a:t>
+              <a:t>10/01/2023</a:t>
             </a:fld>
             <a:endParaRPr lang="es-ES"/>
           </a:p>
@@ -1417,7 +1415,7 @@
           <a:p>
             <a:fld id="{7B9DECDD-3A1C-458C-A44B-DAA273418DF6}" type="datetimeFigureOut">
               <a:rPr lang="es-ES" smtClean="0"/>
-              <a:t>13/12/2022</a:t>
+              <a:t>10/01/2023</a:t>
             </a:fld>
             <a:endParaRPr lang="es-ES"/>
           </a:p>
@@ -1829,7 +1827,7 @@
           <a:p>
             <a:fld id="{7B9DECDD-3A1C-458C-A44B-DAA273418DF6}" type="datetimeFigureOut">
               <a:rPr lang="es-ES" smtClean="0"/>
-              <a:t>13/12/2022</a:t>
+              <a:t>10/01/2023</a:t>
             </a:fld>
             <a:endParaRPr lang="es-ES"/>
           </a:p>
@@ -1970,7 +1968,7 @@
           <a:p>
             <a:fld id="{7B9DECDD-3A1C-458C-A44B-DAA273418DF6}" type="datetimeFigureOut">
               <a:rPr lang="es-ES" smtClean="0"/>
-              <a:t>13/12/2022</a:t>
+              <a:t>10/01/2023</a:t>
             </a:fld>
             <a:endParaRPr lang="es-ES"/>
           </a:p>
@@ -2083,7 +2081,7 @@
           <a:p>
             <a:fld id="{7B9DECDD-3A1C-458C-A44B-DAA273418DF6}" type="datetimeFigureOut">
               <a:rPr lang="es-ES" smtClean="0"/>
-              <a:t>13/12/2022</a:t>
+              <a:t>10/01/2023</a:t>
             </a:fld>
             <a:endParaRPr lang="es-ES"/>
           </a:p>
@@ -2394,7 +2392,7 @@
           <a:p>
             <a:fld id="{7B9DECDD-3A1C-458C-A44B-DAA273418DF6}" type="datetimeFigureOut">
               <a:rPr lang="es-ES" smtClean="0"/>
-              <a:t>13/12/2022</a:t>
+              <a:t>10/01/2023</a:t>
             </a:fld>
             <a:endParaRPr lang="es-ES"/>
           </a:p>
@@ -2682,7 +2680,7 @@
           <a:p>
             <a:fld id="{7B9DECDD-3A1C-458C-A44B-DAA273418DF6}" type="datetimeFigureOut">
               <a:rPr lang="es-ES" smtClean="0"/>
-              <a:t>13/12/2022</a:t>
+              <a:t>10/01/2023</a:t>
             </a:fld>
             <a:endParaRPr lang="es-ES"/>
           </a:p>
@@ -2923,7 +2921,7 @@
           <a:p>
             <a:fld id="{7B9DECDD-3A1C-458C-A44B-DAA273418DF6}" type="datetimeFigureOut">
               <a:rPr lang="es-ES" smtClean="0"/>
-              <a:t>13/12/2022</a:t>
+              <a:t>10/01/2023</a:t>
             </a:fld>
             <a:endParaRPr lang="es-ES"/>
           </a:p>
@@ -3378,10 +3376,10 @@
       </p:sp>
       <p:pic>
         <p:nvPicPr>
-          <p:cNvPr id="11" name="Imagen 10" descr="Diagrama, Dibujo de ingeniería&#10;&#10;Descripción generada automáticamente">
-            <a:extLst>
-              <a:ext uri="{FF2B5EF4-FFF2-40B4-BE49-F238E27FC236}">
-                <a16:creationId xmlns:a16="http://schemas.microsoft.com/office/drawing/2014/main" id="{82CF72D6-9207-92BB-A7C4-60D849803868}"/>
+          <p:cNvPr id="14" name="Imagen 13" descr="Una mano muestra un objeto en la mano&#10;&#10;Descripción generada automáticamente con confianza media">
+            <a:extLst>
+              <a:ext uri="{FF2B5EF4-FFF2-40B4-BE49-F238E27FC236}">
+                <a16:creationId xmlns:a16="http://schemas.microsoft.com/office/drawing/2014/main" id="{2227EBBC-A758-890E-745E-F75FD8BC2F0D}"/>
               </a:ext>
             </a:extLst>
           </p:cNvPr>
@@ -3392,42 +3390,6 @@
         </p:nvPicPr>
         <p:blipFill>
           <a:blip r:embed="rId2">
-            <a:extLst>
-              <a:ext uri="{28A0092B-C50C-407E-A947-70E740481C1C}">
-                <a14:useLocalDpi xmlns:a14="http://schemas.microsoft.com/office/drawing/2010/main" val="0"/>
-              </a:ext>
-            </a:extLst>
-          </a:blip>
-          <a:stretch>
-            <a:fillRect/>
-          </a:stretch>
-        </p:blipFill>
-        <p:spPr>
-          <a:xfrm>
-            <a:off x="7611401" y="1662816"/>
-            <a:ext cx="3369998" cy="3816848"/>
-          </a:xfrm>
-          <a:prstGeom prst="rect">
-            <a:avLst/>
-          </a:prstGeom>
-        </p:spPr>
-      </p:pic>
-      <p:pic>
-        <p:nvPicPr>
-          <p:cNvPr id="14" name="Imagen 13" descr="Una mano muestra un objeto en la mano&#10;&#10;Descripción generada automáticamente con confianza media">
-            <a:extLst>
-              <a:ext uri="{FF2B5EF4-FFF2-40B4-BE49-F238E27FC236}">
-                <a16:creationId xmlns:a16="http://schemas.microsoft.com/office/drawing/2014/main" id="{2227EBBC-A758-890E-745E-F75FD8BC2F0D}"/>
-              </a:ext>
-            </a:extLst>
-          </p:cNvPr>
-          <p:cNvPicPr>
-            <a:picLocks noChangeAspect="1"/>
-          </p:cNvPicPr>
-          <p:nvPr/>
-        </p:nvPicPr>
-        <p:blipFill>
-          <a:blip r:embed="rId3">
             <a:extLst>
               <a:ext uri="{28A0092B-C50C-407E-A947-70E740481C1C}">
                 <a14:useLocalDpi xmlns:a14="http://schemas.microsoft.com/office/drawing/2010/main" val="0"/>
@@ -3494,6 +3456,83 @@
           </a:p>
         </p:txBody>
       </p:sp>
+      <p:pic>
+        <p:nvPicPr>
+          <p:cNvPr id="3" name="Imagen 2" descr="Diagrama&#10;&#10;Descripción generada automáticamente">
+            <a:extLst>
+              <a:ext uri="{FF2B5EF4-FFF2-40B4-BE49-F238E27FC236}">
+                <a16:creationId xmlns:a16="http://schemas.microsoft.com/office/drawing/2014/main" id="{A46678EB-7EE5-FD43-F40B-EB3636D3BFE2}"/>
+              </a:ext>
+            </a:extLst>
+          </p:cNvPr>
+          <p:cNvPicPr>
+            <a:picLocks noChangeAspect="1"/>
+          </p:cNvPicPr>
+          <p:nvPr/>
+        </p:nvPicPr>
+        <p:blipFill>
+          <a:blip r:embed="rId3">
+            <a:extLst>
+              <a:ext uri="{28A0092B-C50C-407E-A947-70E740481C1C}">
+                <a14:useLocalDpi xmlns:a14="http://schemas.microsoft.com/office/drawing/2010/main" val="0"/>
+              </a:ext>
+            </a:extLst>
+          </a:blip>
+          <a:srcRect/>
+          <a:stretch>
+            <a:fillRect/>
+          </a:stretch>
+        </p:blipFill>
+        <p:spPr bwMode="auto">
+          <a:xfrm>
+            <a:off x="7445227" y="575445"/>
+            <a:ext cx="4080661" cy="2888791"/>
+          </a:xfrm>
+          <a:prstGeom prst="rect">
+            <a:avLst/>
+          </a:prstGeom>
+          <a:noFill/>
+          <a:ln>
+            <a:noFill/>
+          </a:ln>
+        </p:spPr>
+      </p:pic>
+      <p:pic>
+        <p:nvPicPr>
+          <p:cNvPr id="4" name="Imagen 3" descr="Diagrama, Dibujo de ingeniería&#10;&#10;Descripción generada automáticamente">
+            <a:extLst>
+              <a:ext uri="{FF2B5EF4-FFF2-40B4-BE49-F238E27FC236}">
+                <a16:creationId xmlns:a16="http://schemas.microsoft.com/office/drawing/2014/main" id="{7BE50BA9-D550-7062-BBF6-332D7EFCFBF7}"/>
+              </a:ext>
+            </a:extLst>
+          </p:cNvPr>
+          <p:cNvPicPr>
+            <a:picLocks noChangeAspect="1"/>
+          </p:cNvPicPr>
+          <p:nvPr/>
+        </p:nvPicPr>
+        <p:blipFill>
+          <a:blip r:embed="rId4">
+            <a:extLst>
+              <a:ext uri="{28A0092B-C50C-407E-A947-70E740481C1C}">
+                <a14:useLocalDpi xmlns:a14="http://schemas.microsoft.com/office/drawing/2010/main" val="0"/>
+              </a:ext>
+            </a:extLst>
+          </a:blip>
+          <a:stretch>
+            <a:fillRect/>
+          </a:stretch>
+        </p:blipFill>
+        <p:spPr>
+          <a:xfrm>
+            <a:off x="8380996" y="3710596"/>
+            <a:ext cx="2440514" cy="2764118"/>
+          </a:xfrm>
+          <a:prstGeom prst="rect">
+            <a:avLst/>
+          </a:prstGeom>
+        </p:spPr>
+      </p:pic>
     </p:spTree>
     <p:extLst>
       <p:ext uri="{BB962C8B-B14F-4D97-AF65-F5344CB8AC3E}">
@@ -3555,17 +3594,17 @@
             <a:pPr algn="ctr"/>
             <a:r>
               <a:rPr lang="es-ES" sz="3200" dirty="0"/>
-              <a:t>Respuesta teórica despreciando efecto de la masa</a:t>
+              <a:t>Diagrama de bloques</a:t>
             </a:r>
           </a:p>
         </p:txBody>
       </p:sp>
       <p:pic>
         <p:nvPicPr>
-          <p:cNvPr id="7" name="Imagen 6" descr="Gráfico, Gráfico de líneas&#10;&#10;Descripción generada automáticamente">
-            <a:extLst>
-              <a:ext uri="{FF2B5EF4-FFF2-40B4-BE49-F238E27FC236}">
-                <a16:creationId xmlns:a16="http://schemas.microsoft.com/office/drawing/2014/main" id="{E9072E52-27B1-C035-7F68-2B1BB1E2A51A}"/>
+          <p:cNvPr id="4" name="Imagen 3" descr="Diagrama&#10;&#10;Descripción generada automáticamente">
+            <a:extLst>
+              <a:ext uri="{FF2B5EF4-FFF2-40B4-BE49-F238E27FC236}">
+                <a16:creationId xmlns:a16="http://schemas.microsoft.com/office/drawing/2014/main" id="{BF754872-9D6F-AD38-7E3A-14B1E32159C2}"/>
               </a:ext>
             </a:extLst>
           </p:cNvPr>
@@ -3588,8 +3627,8 @@
         </p:blipFill>
         <p:spPr>
           <a:xfrm>
-            <a:off x="2775541" y="822988"/>
-            <a:ext cx="6169123" cy="5212024"/>
+            <a:off x="397318" y="1834293"/>
+            <a:ext cx="11397364" cy="3189413"/>
           </a:xfrm>
           <a:prstGeom prst="rect">
             <a:avLst/>
@@ -3599,7 +3638,7 @@
     </p:spTree>
     <p:extLst>
       <p:ext uri="{BB962C8B-B14F-4D97-AF65-F5344CB8AC3E}">
-        <p14:creationId xmlns:p14="http://schemas.microsoft.com/office/powerpoint/2010/main" val="2286750182"/>
+        <p14:creationId xmlns:p14="http://schemas.microsoft.com/office/powerpoint/2010/main" val="2071584887"/>
       </p:ext>
     </p:extLst>
   </p:cSld>
@@ -3657,7 +3696,7 @@
             <a:pPr algn="ctr"/>
             <a:r>
               <a:rPr lang="es-ES" sz="3200" dirty="0"/>
-              <a:t>Respuesta real de la planta</a:t>
+              <a:t>ZN escalón</a:t>
             </a:r>
           </a:p>
         </p:txBody>
@@ -3667,7 +3706,7 @@
           <p:cNvPr id="4" name="Imagen 3" descr="Gráfico, Gráfico de líneas&#10;&#10;Descripción generada automáticamente">
             <a:extLst>
               <a:ext uri="{FF2B5EF4-FFF2-40B4-BE49-F238E27FC236}">
-                <a16:creationId xmlns:a16="http://schemas.microsoft.com/office/drawing/2014/main" id="{04C775C2-8A85-14DC-FD1A-BCFD8AE6CBCD}"/>
+                <a16:creationId xmlns:a16="http://schemas.microsoft.com/office/drawing/2014/main" id="{F741ED04-B193-F6CB-CB8A-FB4EEC600522}"/>
               </a:ext>
             </a:extLst>
           </p:cNvPr>
@@ -3690,8 +3729,8 @@
         </p:blipFill>
         <p:spPr>
           <a:xfrm>
-            <a:off x="2401740" y="746551"/>
-            <a:ext cx="6916726" cy="5364897"/>
+            <a:off x="2811071" y="669495"/>
+            <a:ext cx="6569857" cy="5670345"/>
           </a:xfrm>
           <a:prstGeom prst="rect">
             <a:avLst/>
@@ -3701,7 +3740,7 @@
     </p:spTree>
     <p:extLst>
       <p:ext uri="{BB962C8B-B14F-4D97-AF65-F5344CB8AC3E}">
-        <p14:creationId xmlns:p14="http://schemas.microsoft.com/office/powerpoint/2010/main" val="1559505765"/>
+        <p14:creationId xmlns:p14="http://schemas.microsoft.com/office/powerpoint/2010/main" val="28435917"/>
       </p:ext>
     </p:extLst>
   </p:cSld>
@@ -3758,18 +3797,19 @@
           <a:p>
             <a:pPr algn="ctr"/>
             <a:r>
-              <a:rPr lang="es-ES" sz="3200" dirty="0"/>
-              <a:t>Forma deseada para diseño de controlador</a:t>
-            </a:r>
+              <a:rPr lang="es-ES" sz="3200" dirty="0" err="1"/>
+              <a:t>Chreswick</a:t>
+            </a:r>
+            <a:endParaRPr lang="es-ES" sz="3200" dirty="0"/>
           </a:p>
         </p:txBody>
       </p:sp>
       <p:pic>
         <p:nvPicPr>
-          <p:cNvPr id="5" name="Imagen 4" descr="Diagrama&#10;&#10;Descripción generada automáticamente">
-            <a:extLst>
-              <a:ext uri="{FF2B5EF4-FFF2-40B4-BE49-F238E27FC236}">
-                <a16:creationId xmlns:a16="http://schemas.microsoft.com/office/drawing/2014/main" id="{5B8B2437-4EAF-7513-E006-8D6A7D154F18}"/>
+          <p:cNvPr id="5" name="Imagen 4" descr="Gráfico&#10;&#10;Descripción generada automáticamente">
+            <a:extLst>
+              <a:ext uri="{FF2B5EF4-FFF2-40B4-BE49-F238E27FC236}">
+                <a16:creationId xmlns:a16="http://schemas.microsoft.com/office/drawing/2014/main" id="{428FE5BA-2427-AF8C-1511-933C43080209}"/>
               </a:ext>
             </a:extLst>
           </p:cNvPr>
@@ -3792,44 +3832,8 @@
         </p:blipFill>
         <p:spPr>
           <a:xfrm>
-            <a:off x="434663" y="663505"/>
-            <a:ext cx="5320784" cy="5530989"/>
-          </a:xfrm>
-          <a:prstGeom prst="rect">
-            <a:avLst/>
-          </a:prstGeom>
-        </p:spPr>
-      </p:pic>
-      <p:pic>
-        <p:nvPicPr>
-          <p:cNvPr id="6" name="Imagen 5" descr="Gráfico, Gráfico de líneas&#10;&#10;Descripción generada automáticamente">
-            <a:extLst>
-              <a:ext uri="{FF2B5EF4-FFF2-40B4-BE49-F238E27FC236}">
-                <a16:creationId xmlns:a16="http://schemas.microsoft.com/office/drawing/2014/main" id="{53E0879C-51DE-0797-840B-E3BC0F17DFC4}"/>
-              </a:ext>
-            </a:extLst>
-          </p:cNvPr>
-          <p:cNvPicPr>
-            <a:picLocks noChangeAspect="1"/>
-          </p:cNvPicPr>
-          <p:nvPr/>
-        </p:nvPicPr>
-        <p:blipFill>
-          <a:blip r:embed="rId3">
-            <a:extLst>
-              <a:ext uri="{28A0092B-C50C-407E-A947-70E740481C1C}">
-                <a14:useLocalDpi xmlns:a14="http://schemas.microsoft.com/office/drawing/2010/main" val="0"/>
-              </a:ext>
-            </a:extLst>
-          </a:blip>
-          <a:stretch>
-            <a:fillRect/>
-          </a:stretch>
-        </p:blipFill>
-        <p:spPr>
-          <a:xfrm>
-            <a:off x="5673731" y="1036669"/>
-            <a:ext cx="6307363" cy="4892250"/>
+            <a:off x="2882167" y="731773"/>
+            <a:ext cx="6427665" cy="5394454"/>
           </a:xfrm>
           <a:prstGeom prst="rect">
             <a:avLst/>
@@ -3839,7 +3843,7 @@
     </p:spTree>
     <p:extLst>
       <p:ext uri="{BB962C8B-B14F-4D97-AF65-F5344CB8AC3E}">
-        <p14:creationId xmlns:p14="http://schemas.microsoft.com/office/powerpoint/2010/main" val="1345154346"/>
+        <p14:creationId xmlns:p14="http://schemas.microsoft.com/office/powerpoint/2010/main" val="2348727708"/>
       </p:ext>
     </p:extLst>
   </p:cSld>
@@ -3897,17 +3901,17 @@
             <a:pPr algn="ctr"/>
             <a:r>
               <a:rPr lang="es-ES" sz="3200" dirty="0"/>
-              <a:t>Realimentación unitaria de la planta</a:t>
+              <a:t>Comparación</a:t>
             </a:r>
           </a:p>
         </p:txBody>
       </p:sp>
       <p:pic>
         <p:nvPicPr>
-          <p:cNvPr id="7" name="Imagen 6" descr="Diagrama&#10;&#10;Descripción generada automáticamente">
-            <a:extLst>
-              <a:ext uri="{FF2B5EF4-FFF2-40B4-BE49-F238E27FC236}">
-                <a16:creationId xmlns:a16="http://schemas.microsoft.com/office/drawing/2014/main" id="{CCBEC644-2EA5-6B96-69CB-D2C04F7AE38E}"/>
+          <p:cNvPr id="4" name="Imagen 3" descr="Gráfico&#10;&#10;Descripción generada automáticamente">
+            <a:extLst>
+              <a:ext uri="{FF2B5EF4-FFF2-40B4-BE49-F238E27FC236}">
+                <a16:creationId xmlns:a16="http://schemas.microsoft.com/office/drawing/2014/main" id="{5BAE1880-E8D3-FCAA-137B-27A86AE7B008}"/>
               </a:ext>
             </a:extLst>
           </p:cNvPr>
@@ -3930,8 +3934,8 @@
         </p:blipFill>
         <p:spPr>
           <a:xfrm>
-            <a:off x="487537" y="1376680"/>
-            <a:ext cx="10745132" cy="4104640"/>
+            <a:off x="2226417" y="623410"/>
+            <a:ext cx="7267372" cy="6041550"/>
           </a:xfrm>
           <a:prstGeom prst="rect">
             <a:avLst/>
@@ -3941,620 +3945,7 @@
     </p:spTree>
     <p:extLst>
       <p:ext uri="{BB962C8B-B14F-4D97-AF65-F5344CB8AC3E}">
-        <p14:creationId xmlns:p14="http://schemas.microsoft.com/office/powerpoint/2010/main" val="3520975447"/>
-      </p:ext>
-    </p:extLst>
-  </p:cSld>
-  <p:clrMapOvr>
-    <a:masterClrMapping/>
-  </p:clrMapOvr>
-</p:sld>
-</file>
-
-<file path=ppt/slides/slide14.xml><?xml version="1.0" encoding="utf-8"?>
-<p:sld xmlns:a="http://schemas.openxmlformats.org/drawingml/2006/main" xmlns:r="http://schemas.openxmlformats.org/officeDocument/2006/relationships" xmlns:p="http://schemas.openxmlformats.org/presentationml/2006/main">
-  <p:cSld>
-    <p:spTree>
-      <p:nvGrpSpPr>
-        <p:cNvPr id="1" name=""/>
-        <p:cNvGrpSpPr/>
-        <p:nvPr/>
-      </p:nvGrpSpPr>
-      <p:grpSpPr>
-        <a:xfrm>
-          <a:off x="0" y="0"/>
-          <a:ext cx="0" cy="0"/>
-          <a:chOff x="0" y="0"/>
-          <a:chExt cx="0" cy="0"/>
-        </a:xfrm>
-      </p:grpSpPr>
-      <p:sp>
-        <p:nvSpPr>
-          <p:cNvPr id="2" name="Título 1">
-            <a:extLst>
-              <a:ext uri="{FF2B5EF4-FFF2-40B4-BE49-F238E27FC236}">
-                <a16:creationId xmlns:a16="http://schemas.microsoft.com/office/drawing/2014/main" id="{7D273FCD-D6B3-B12D-35D8-963ADA838D04}"/>
-              </a:ext>
-            </a:extLst>
-          </p:cNvPr>
-          <p:cNvSpPr>
-            <a:spLocks noGrp="1"/>
-          </p:cNvSpPr>
-          <p:nvPr>
-            <p:ph type="title"/>
-          </p:nvPr>
-        </p:nvSpPr>
-        <p:spPr>
-          <a:xfrm>
-            <a:off x="1175425" y="32426"/>
-            <a:ext cx="9369357" cy="738669"/>
-          </a:xfrm>
-        </p:spPr>
-        <p:txBody>
-          <a:bodyPr>
-            <a:normAutofit fontScale="90000"/>
-          </a:bodyPr>
-          <a:lstStyle/>
-          <a:p>
-            <a:pPr algn="ctr"/>
-            <a:r>
-              <a:rPr lang="es-ES" sz="3200" dirty="0"/>
-              <a:t>Respuesta teórica de la planta realimentada unitariamente</a:t>
-            </a:r>
-          </a:p>
-        </p:txBody>
-      </p:sp>
-      <p:pic>
-        <p:nvPicPr>
-          <p:cNvPr id="7" name="Imagen 6" descr="Gráfico&#10;&#10;Descripción generada automáticamente">
-            <a:extLst>
-              <a:ext uri="{FF2B5EF4-FFF2-40B4-BE49-F238E27FC236}">
-                <a16:creationId xmlns:a16="http://schemas.microsoft.com/office/drawing/2014/main" id="{94E3D367-D165-5636-DE1E-1BA362B0CE20}"/>
-              </a:ext>
-            </a:extLst>
-          </p:cNvPr>
-          <p:cNvPicPr>
-            <a:picLocks noChangeAspect="1"/>
-          </p:cNvPicPr>
-          <p:nvPr/>
-        </p:nvPicPr>
-        <p:blipFill>
-          <a:blip r:embed="rId2">
-            <a:extLst>
-              <a:ext uri="{28A0092B-C50C-407E-A947-70E740481C1C}">
-                <a14:useLocalDpi xmlns:a14="http://schemas.microsoft.com/office/drawing/2010/main" val="0"/>
-              </a:ext>
-            </a:extLst>
-          </a:blip>
-          <a:stretch>
-            <a:fillRect/>
-          </a:stretch>
-        </p:blipFill>
-        <p:spPr>
-          <a:xfrm>
-            <a:off x="2392903" y="771095"/>
-            <a:ext cx="6934400" cy="5809282"/>
-          </a:xfrm>
-          <a:prstGeom prst="rect">
-            <a:avLst/>
-          </a:prstGeom>
-        </p:spPr>
-      </p:pic>
-    </p:spTree>
-    <p:extLst>
-      <p:ext uri="{BB962C8B-B14F-4D97-AF65-F5344CB8AC3E}">
-        <p14:creationId xmlns:p14="http://schemas.microsoft.com/office/powerpoint/2010/main" val="1487218276"/>
-      </p:ext>
-    </p:extLst>
-  </p:cSld>
-  <p:clrMapOvr>
-    <a:masterClrMapping/>
-  </p:clrMapOvr>
-</p:sld>
-</file>
-
-<file path=ppt/slides/slide15.xml><?xml version="1.0" encoding="utf-8"?>
-<p:sld xmlns:a="http://schemas.openxmlformats.org/drawingml/2006/main" xmlns:r="http://schemas.openxmlformats.org/officeDocument/2006/relationships" xmlns:p="http://schemas.openxmlformats.org/presentationml/2006/main">
-  <p:cSld>
-    <p:spTree>
-      <p:nvGrpSpPr>
-        <p:cNvPr id="1" name=""/>
-        <p:cNvGrpSpPr/>
-        <p:nvPr/>
-      </p:nvGrpSpPr>
-      <p:grpSpPr>
-        <a:xfrm>
-          <a:off x="0" y="0"/>
-          <a:ext cx="0" cy="0"/>
-          <a:chOff x="0" y="0"/>
-          <a:chExt cx="0" cy="0"/>
-        </a:xfrm>
-      </p:grpSpPr>
-      <p:sp>
-        <p:nvSpPr>
-          <p:cNvPr id="2" name="Título 1">
-            <a:extLst>
-              <a:ext uri="{FF2B5EF4-FFF2-40B4-BE49-F238E27FC236}">
-                <a16:creationId xmlns:a16="http://schemas.microsoft.com/office/drawing/2014/main" id="{7D273FCD-D6B3-B12D-35D8-963ADA838D04}"/>
-              </a:ext>
-            </a:extLst>
-          </p:cNvPr>
-          <p:cNvSpPr>
-            <a:spLocks noGrp="1"/>
-          </p:cNvSpPr>
-          <p:nvPr>
-            <p:ph type="title"/>
-          </p:nvPr>
-        </p:nvSpPr>
-        <p:spPr>
-          <a:xfrm>
-            <a:off x="1175425" y="32426"/>
-            <a:ext cx="9369357" cy="738669"/>
-          </a:xfrm>
-        </p:spPr>
-        <p:txBody>
-          <a:bodyPr>
-            <a:normAutofit/>
-          </a:bodyPr>
-          <a:lstStyle/>
-          <a:p>
-            <a:pPr algn="ctr"/>
-            <a:r>
-              <a:rPr lang="es-ES" sz="3200" dirty="0"/>
-              <a:t>Identificación empírica</a:t>
-            </a:r>
-          </a:p>
-        </p:txBody>
-      </p:sp>
-      <p:pic>
-        <p:nvPicPr>
-          <p:cNvPr id="6" name="Imagen 5" descr="Gráfico&#10;&#10;Descripción generada automáticamente">
-            <a:extLst>
-              <a:ext uri="{FF2B5EF4-FFF2-40B4-BE49-F238E27FC236}">
-                <a16:creationId xmlns:a16="http://schemas.microsoft.com/office/drawing/2014/main" id="{517CA969-39FE-5ECD-625C-1A665CABC9EF}"/>
-              </a:ext>
-            </a:extLst>
-          </p:cNvPr>
-          <p:cNvPicPr>
-            <a:picLocks noChangeAspect="1"/>
-          </p:cNvPicPr>
-          <p:nvPr/>
-        </p:nvPicPr>
-        <p:blipFill>
-          <a:blip r:embed="rId2">
-            <a:extLst>
-              <a:ext uri="{28A0092B-C50C-407E-A947-70E740481C1C}">
-                <a14:useLocalDpi xmlns:a14="http://schemas.microsoft.com/office/drawing/2010/main" val="0"/>
-              </a:ext>
-            </a:extLst>
-          </a:blip>
-          <a:stretch>
-            <a:fillRect/>
-          </a:stretch>
-        </p:blipFill>
-        <p:spPr>
-          <a:xfrm>
-            <a:off x="2788648" y="782053"/>
-            <a:ext cx="6614704" cy="5293893"/>
-          </a:xfrm>
-          <a:prstGeom prst="rect">
-            <a:avLst/>
-          </a:prstGeom>
-        </p:spPr>
-      </p:pic>
-    </p:spTree>
-    <p:extLst>
-      <p:ext uri="{BB962C8B-B14F-4D97-AF65-F5344CB8AC3E}">
-        <p14:creationId xmlns:p14="http://schemas.microsoft.com/office/powerpoint/2010/main" val="1003764746"/>
-      </p:ext>
-    </p:extLst>
-  </p:cSld>
-  <p:clrMapOvr>
-    <a:masterClrMapping/>
-  </p:clrMapOvr>
-</p:sld>
-</file>
-
-<file path=ppt/slides/slide16.xml><?xml version="1.0" encoding="utf-8"?>
-<p:sld xmlns:a="http://schemas.openxmlformats.org/drawingml/2006/main" xmlns:r="http://schemas.openxmlformats.org/officeDocument/2006/relationships" xmlns:p="http://schemas.openxmlformats.org/presentationml/2006/main">
-  <p:cSld>
-    <p:spTree>
-      <p:nvGrpSpPr>
-        <p:cNvPr id="1" name=""/>
-        <p:cNvGrpSpPr/>
-        <p:nvPr/>
-      </p:nvGrpSpPr>
-      <p:grpSpPr>
-        <a:xfrm>
-          <a:off x="0" y="0"/>
-          <a:ext cx="0" cy="0"/>
-          <a:chOff x="0" y="0"/>
-          <a:chExt cx="0" cy="0"/>
-        </a:xfrm>
-      </p:grpSpPr>
-      <p:sp>
-        <p:nvSpPr>
-          <p:cNvPr id="2" name="Título 1">
-            <a:extLst>
-              <a:ext uri="{FF2B5EF4-FFF2-40B4-BE49-F238E27FC236}">
-                <a16:creationId xmlns:a16="http://schemas.microsoft.com/office/drawing/2014/main" id="{7D273FCD-D6B3-B12D-35D8-963ADA838D04}"/>
-              </a:ext>
-            </a:extLst>
-          </p:cNvPr>
-          <p:cNvSpPr>
-            <a:spLocks noGrp="1"/>
-          </p:cNvSpPr>
-          <p:nvPr>
-            <p:ph type="title"/>
-          </p:nvPr>
-        </p:nvSpPr>
-        <p:spPr>
-          <a:xfrm>
-            <a:off x="1175425" y="32426"/>
-            <a:ext cx="9369357" cy="738669"/>
-          </a:xfrm>
-        </p:spPr>
-        <p:txBody>
-          <a:bodyPr>
-            <a:normAutofit/>
-          </a:bodyPr>
-          <a:lstStyle/>
-          <a:p>
-            <a:pPr algn="ctr"/>
-            <a:r>
-              <a:rPr lang="es-ES" sz="3200" dirty="0"/>
-              <a:t>Identificación de parámetros</a:t>
-            </a:r>
-          </a:p>
-        </p:txBody>
-      </p:sp>
-      <p:pic>
-        <p:nvPicPr>
-          <p:cNvPr id="5" name="Imagen 4">
-            <a:extLst>
-              <a:ext uri="{FF2B5EF4-FFF2-40B4-BE49-F238E27FC236}">
-                <a16:creationId xmlns:a16="http://schemas.microsoft.com/office/drawing/2014/main" id="{20DA2E67-DF58-6873-A0BF-0511C5DFCE6F}"/>
-              </a:ext>
-            </a:extLst>
-          </p:cNvPr>
-          <p:cNvPicPr>
-            <a:picLocks noChangeAspect="1"/>
-          </p:cNvPicPr>
-          <p:nvPr/>
-        </p:nvPicPr>
-        <p:blipFill>
-          <a:blip r:embed="rId2">
-            <a:extLst>
-              <a:ext uri="{28A0092B-C50C-407E-A947-70E740481C1C}">
-                <a14:useLocalDpi xmlns:a14="http://schemas.microsoft.com/office/drawing/2010/main" val="0"/>
-              </a:ext>
-            </a:extLst>
-          </a:blip>
-          <a:stretch>
-            <a:fillRect/>
-          </a:stretch>
-        </p:blipFill>
-        <p:spPr>
-          <a:xfrm>
-            <a:off x="2680505" y="771095"/>
-            <a:ext cx="6830990" cy="5583884"/>
-          </a:xfrm>
-          <a:prstGeom prst="rect">
-            <a:avLst/>
-          </a:prstGeom>
-        </p:spPr>
-      </p:pic>
-    </p:spTree>
-    <p:extLst>
-      <p:ext uri="{BB962C8B-B14F-4D97-AF65-F5344CB8AC3E}">
-        <p14:creationId xmlns:p14="http://schemas.microsoft.com/office/powerpoint/2010/main" val="3672870487"/>
-      </p:ext>
-    </p:extLst>
-  </p:cSld>
-  <p:clrMapOvr>
-    <a:masterClrMapping/>
-  </p:clrMapOvr>
-</p:sld>
-</file>
-
-<file path=ppt/slides/slide17.xml><?xml version="1.0" encoding="utf-8"?>
-<p:sld xmlns:a="http://schemas.openxmlformats.org/drawingml/2006/main" xmlns:r="http://schemas.openxmlformats.org/officeDocument/2006/relationships" xmlns:p="http://schemas.openxmlformats.org/presentationml/2006/main">
-  <p:cSld>
-    <p:spTree>
-      <p:nvGrpSpPr>
-        <p:cNvPr id="1" name=""/>
-        <p:cNvGrpSpPr/>
-        <p:nvPr/>
-      </p:nvGrpSpPr>
-      <p:grpSpPr>
-        <a:xfrm>
-          <a:off x="0" y="0"/>
-          <a:ext cx="0" cy="0"/>
-          <a:chOff x="0" y="0"/>
-          <a:chExt cx="0" cy="0"/>
-        </a:xfrm>
-      </p:grpSpPr>
-      <p:sp>
-        <p:nvSpPr>
-          <p:cNvPr id="2" name="Título 1">
-            <a:extLst>
-              <a:ext uri="{FF2B5EF4-FFF2-40B4-BE49-F238E27FC236}">
-                <a16:creationId xmlns:a16="http://schemas.microsoft.com/office/drawing/2014/main" id="{7D273FCD-D6B3-B12D-35D8-963ADA838D04}"/>
-              </a:ext>
-            </a:extLst>
-          </p:cNvPr>
-          <p:cNvSpPr>
-            <a:spLocks noGrp="1"/>
-          </p:cNvSpPr>
-          <p:nvPr>
-            <p:ph type="title"/>
-          </p:nvPr>
-        </p:nvSpPr>
-        <p:spPr>
-          <a:xfrm>
-            <a:off x="1175425" y="32426"/>
-            <a:ext cx="9369357" cy="738669"/>
-          </a:xfrm>
-        </p:spPr>
-        <p:txBody>
-          <a:bodyPr>
-            <a:normAutofit/>
-          </a:bodyPr>
-          <a:lstStyle/>
-          <a:p>
-            <a:pPr algn="ctr"/>
-            <a:r>
-              <a:rPr lang="es-ES" sz="3200" dirty="0"/>
-              <a:t>Diagrama de bloques</a:t>
-            </a:r>
-          </a:p>
-        </p:txBody>
-      </p:sp>
-      <p:pic>
-        <p:nvPicPr>
-          <p:cNvPr id="4" name="Imagen 3" descr="Diagrama&#10;&#10;Descripción generada automáticamente">
-            <a:extLst>
-              <a:ext uri="{FF2B5EF4-FFF2-40B4-BE49-F238E27FC236}">
-                <a16:creationId xmlns:a16="http://schemas.microsoft.com/office/drawing/2014/main" id="{BF754872-9D6F-AD38-7E3A-14B1E32159C2}"/>
-              </a:ext>
-            </a:extLst>
-          </p:cNvPr>
-          <p:cNvPicPr>
-            <a:picLocks noChangeAspect="1"/>
-          </p:cNvPicPr>
-          <p:nvPr/>
-        </p:nvPicPr>
-        <p:blipFill>
-          <a:blip r:embed="rId2">
-            <a:extLst>
-              <a:ext uri="{28A0092B-C50C-407E-A947-70E740481C1C}">
-                <a14:useLocalDpi xmlns:a14="http://schemas.microsoft.com/office/drawing/2010/main" val="0"/>
-              </a:ext>
-            </a:extLst>
-          </a:blip>
-          <a:stretch>
-            <a:fillRect/>
-          </a:stretch>
-        </p:blipFill>
-        <p:spPr>
-          <a:xfrm>
-            <a:off x="397318" y="1834293"/>
-            <a:ext cx="11397364" cy="3189413"/>
-          </a:xfrm>
-          <a:prstGeom prst="rect">
-            <a:avLst/>
-          </a:prstGeom>
-        </p:spPr>
-      </p:pic>
-    </p:spTree>
-    <p:extLst>
-      <p:ext uri="{BB962C8B-B14F-4D97-AF65-F5344CB8AC3E}">
-        <p14:creationId xmlns:p14="http://schemas.microsoft.com/office/powerpoint/2010/main" val="2071584887"/>
-      </p:ext>
-    </p:extLst>
-  </p:cSld>
-  <p:clrMapOvr>
-    <a:masterClrMapping/>
-  </p:clrMapOvr>
-</p:sld>
-</file>
-
-<file path=ppt/slides/slide18.xml><?xml version="1.0" encoding="utf-8"?>
-<p:sld xmlns:a="http://schemas.openxmlformats.org/drawingml/2006/main" xmlns:r="http://schemas.openxmlformats.org/officeDocument/2006/relationships" xmlns:p="http://schemas.openxmlformats.org/presentationml/2006/main">
-  <p:cSld>
-    <p:spTree>
-      <p:nvGrpSpPr>
-        <p:cNvPr id="1" name=""/>
-        <p:cNvGrpSpPr/>
-        <p:nvPr/>
-      </p:nvGrpSpPr>
-      <p:grpSpPr>
-        <a:xfrm>
-          <a:off x="0" y="0"/>
-          <a:ext cx="0" cy="0"/>
-          <a:chOff x="0" y="0"/>
-          <a:chExt cx="0" cy="0"/>
-        </a:xfrm>
-      </p:grpSpPr>
-      <p:sp>
-        <p:nvSpPr>
-          <p:cNvPr id="2" name="Título 1">
-            <a:extLst>
-              <a:ext uri="{FF2B5EF4-FFF2-40B4-BE49-F238E27FC236}">
-                <a16:creationId xmlns:a16="http://schemas.microsoft.com/office/drawing/2014/main" id="{7D273FCD-D6B3-B12D-35D8-963ADA838D04}"/>
-              </a:ext>
-            </a:extLst>
-          </p:cNvPr>
-          <p:cNvSpPr>
-            <a:spLocks noGrp="1"/>
-          </p:cNvSpPr>
-          <p:nvPr>
-            <p:ph type="title"/>
-          </p:nvPr>
-        </p:nvSpPr>
-        <p:spPr>
-          <a:xfrm>
-            <a:off x="1175425" y="32426"/>
-            <a:ext cx="9369357" cy="738669"/>
-          </a:xfrm>
-        </p:spPr>
-        <p:txBody>
-          <a:bodyPr>
-            <a:normAutofit/>
-          </a:bodyPr>
-          <a:lstStyle/>
-          <a:p>
-            <a:pPr algn="ctr"/>
-            <a:r>
-              <a:rPr lang="es-ES" sz="3200" dirty="0"/>
-              <a:t>ZN escalón</a:t>
-            </a:r>
-          </a:p>
-        </p:txBody>
-      </p:sp>
-      <p:pic>
-        <p:nvPicPr>
-          <p:cNvPr id="4" name="Imagen 3" descr="Gráfico, Gráfico de líneas&#10;&#10;Descripción generada automáticamente">
-            <a:extLst>
-              <a:ext uri="{FF2B5EF4-FFF2-40B4-BE49-F238E27FC236}">
-                <a16:creationId xmlns:a16="http://schemas.microsoft.com/office/drawing/2014/main" id="{F741ED04-B193-F6CB-CB8A-FB4EEC600522}"/>
-              </a:ext>
-            </a:extLst>
-          </p:cNvPr>
-          <p:cNvPicPr>
-            <a:picLocks noChangeAspect="1"/>
-          </p:cNvPicPr>
-          <p:nvPr/>
-        </p:nvPicPr>
-        <p:blipFill>
-          <a:blip r:embed="rId2">
-            <a:extLst>
-              <a:ext uri="{28A0092B-C50C-407E-A947-70E740481C1C}">
-                <a14:useLocalDpi xmlns:a14="http://schemas.microsoft.com/office/drawing/2010/main" val="0"/>
-              </a:ext>
-            </a:extLst>
-          </a:blip>
-          <a:stretch>
-            <a:fillRect/>
-          </a:stretch>
-        </p:blipFill>
-        <p:spPr>
-          <a:xfrm>
-            <a:off x="2811071" y="669495"/>
-            <a:ext cx="6569857" cy="5670345"/>
-          </a:xfrm>
-          <a:prstGeom prst="rect">
-            <a:avLst/>
-          </a:prstGeom>
-        </p:spPr>
-      </p:pic>
-    </p:spTree>
-    <p:extLst>
-      <p:ext uri="{BB962C8B-B14F-4D97-AF65-F5344CB8AC3E}">
-        <p14:creationId xmlns:p14="http://schemas.microsoft.com/office/powerpoint/2010/main" val="28435917"/>
-      </p:ext>
-    </p:extLst>
-  </p:cSld>
-  <p:clrMapOvr>
-    <a:masterClrMapping/>
-  </p:clrMapOvr>
-</p:sld>
-</file>
-
-<file path=ppt/slides/slide19.xml><?xml version="1.0" encoding="utf-8"?>
-<p:sld xmlns:a="http://schemas.openxmlformats.org/drawingml/2006/main" xmlns:r="http://schemas.openxmlformats.org/officeDocument/2006/relationships" xmlns:p="http://schemas.openxmlformats.org/presentationml/2006/main">
-  <p:cSld>
-    <p:spTree>
-      <p:nvGrpSpPr>
-        <p:cNvPr id="1" name=""/>
-        <p:cNvGrpSpPr/>
-        <p:nvPr/>
-      </p:nvGrpSpPr>
-      <p:grpSpPr>
-        <a:xfrm>
-          <a:off x="0" y="0"/>
-          <a:ext cx="0" cy="0"/>
-          <a:chOff x="0" y="0"/>
-          <a:chExt cx="0" cy="0"/>
-        </a:xfrm>
-      </p:grpSpPr>
-      <p:sp>
-        <p:nvSpPr>
-          <p:cNvPr id="2" name="Título 1">
-            <a:extLst>
-              <a:ext uri="{FF2B5EF4-FFF2-40B4-BE49-F238E27FC236}">
-                <a16:creationId xmlns:a16="http://schemas.microsoft.com/office/drawing/2014/main" id="{7D273FCD-D6B3-B12D-35D8-963ADA838D04}"/>
-              </a:ext>
-            </a:extLst>
-          </p:cNvPr>
-          <p:cNvSpPr>
-            <a:spLocks noGrp="1"/>
-          </p:cNvSpPr>
-          <p:nvPr>
-            <p:ph type="title"/>
-          </p:nvPr>
-        </p:nvSpPr>
-        <p:spPr>
-          <a:xfrm>
-            <a:off x="1175425" y="32426"/>
-            <a:ext cx="9369357" cy="738669"/>
-          </a:xfrm>
-        </p:spPr>
-        <p:txBody>
-          <a:bodyPr>
-            <a:normAutofit/>
-          </a:bodyPr>
-          <a:lstStyle/>
-          <a:p>
-            <a:pPr algn="ctr"/>
-            <a:r>
-              <a:rPr lang="es-ES" sz="3200" dirty="0" err="1"/>
-              <a:t>Chreswick</a:t>
-            </a:r>
-            <a:endParaRPr lang="es-ES" sz="3200" dirty="0"/>
-          </a:p>
-        </p:txBody>
-      </p:sp>
-      <p:pic>
-        <p:nvPicPr>
-          <p:cNvPr id="5" name="Imagen 4" descr="Gráfico&#10;&#10;Descripción generada automáticamente">
-            <a:extLst>
-              <a:ext uri="{FF2B5EF4-FFF2-40B4-BE49-F238E27FC236}">
-                <a16:creationId xmlns:a16="http://schemas.microsoft.com/office/drawing/2014/main" id="{428FE5BA-2427-AF8C-1511-933C43080209}"/>
-              </a:ext>
-            </a:extLst>
-          </p:cNvPr>
-          <p:cNvPicPr>
-            <a:picLocks noChangeAspect="1"/>
-          </p:cNvPicPr>
-          <p:nvPr/>
-        </p:nvPicPr>
-        <p:blipFill>
-          <a:blip r:embed="rId2">
-            <a:extLst>
-              <a:ext uri="{28A0092B-C50C-407E-A947-70E740481C1C}">
-                <a14:useLocalDpi xmlns:a14="http://schemas.microsoft.com/office/drawing/2010/main" val="0"/>
-              </a:ext>
-            </a:extLst>
-          </a:blip>
-          <a:stretch>
-            <a:fillRect/>
-          </a:stretch>
-        </p:blipFill>
-        <p:spPr>
-          <a:xfrm>
-            <a:off x="2882167" y="731773"/>
-            <a:ext cx="6427665" cy="5394454"/>
-          </a:xfrm>
-          <a:prstGeom prst="rect">
-            <a:avLst/>
-          </a:prstGeom>
-        </p:spPr>
-      </p:pic>
-    </p:spTree>
-    <p:extLst>
-      <p:ext uri="{BB962C8B-B14F-4D97-AF65-F5344CB8AC3E}">
-        <p14:creationId xmlns:p14="http://schemas.microsoft.com/office/powerpoint/2010/main" val="2348727708"/>
+        <p14:creationId xmlns:p14="http://schemas.microsoft.com/office/powerpoint/2010/main" val="4037393224"/>
       </p:ext>
     </p:extLst>
   </p:cSld>
@@ -4612,17 +4003,17 @@
             <a:pPr algn="ctr"/>
             <a:r>
               <a:rPr lang="es-ES" sz="3200" dirty="0"/>
-              <a:t>Modelado</a:t>
+              <a:t>Respuesta teórica VS respuesta real de la planta</a:t>
             </a:r>
           </a:p>
         </p:txBody>
       </p:sp>
       <p:pic>
         <p:nvPicPr>
-          <p:cNvPr id="11" name="Imagen 10" descr="Diagrama, Dibujo de ingeniería&#10;&#10;Descripción generada automáticamente">
-            <a:extLst>
-              <a:ext uri="{FF2B5EF4-FFF2-40B4-BE49-F238E27FC236}">
-                <a16:creationId xmlns:a16="http://schemas.microsoft.com/office/drawing/2014/main" id="{82CF72D6-9207-92BB-A7C4-60D849803868}"/>
+          <p:cNvPr id="9" name="Imagen 8" descr="Gráfico&#10;&#10;Descripción generada automáticamente">
+            <a:extLst>
+              <a:ext uri="{FF2B5EF4-FFF2-40B4-BE49-F238E27FC236}">
+                <a16:creationId xmlns:a16="http://schemas.microsoft.com/office/drawing/2014/main" id="{C0808FB2-82B0-106A-EABE-3CCBDB94A97B}"/>
               </a:ext>
             </a:extLst>
           </p:cNvPr>
@@ -4645,121 +4036,20 @@
         </p:blipFill>
         <p:spPr>
           <a:xfrm>
-            <a:off x="743241" y="1418976"/>
-            <a:ext cx="3369998" cy="3816848"/>
+            <a:off x="827654" y="1512657"/>
+            <a:ext cx="4496617" cy="3832686"/>
           </a:xfrm>
           <a:prstGeom prst="rect">
             <a:avLst/>
           </a:prstGeom>
         </p:spPr>
       </p:pic>
-      <p:sp>
-        <p:nvSpPr>
-          <p:cNvPr id="3" name="CuadroTexto 2">
-            <a:extLst>
-              <a:ext uri="{FF2B5EF4-FFF2-40B4-BE49-F238E27FC236}">
-                <a16:creationId xmlns:a16="http://schemas.microsoft.com/office/drawing/2014/main" id="{04CF3B9D-6584-BD86-4682-AF1EAE3D5AA2}"/>
-              </a:ext>
-            </a:extLst>
-          </p:cNvPr>
-          <p:cNvSpPr txBox="1"/>
-          <p:nvPr/>
-        </p:nvSpPr>
-        <p:spPr>
-          <a:xfrm>
-            <a:off x="4991423" y="1418976"/>
-            <a:ext cx="2448560" cy="523220"/>
-          </a:xfrm>
-          <a:prstGeom prst="rect">
-            <a:avLst/>
-          </a:prstGeom>
-          <a:noFill/>
-        </p:spPr>
-        <p:txBody>
-          <a:bodyPr wrap="square" rtlCol="0">
-            <a:spAutoFit/>
-          </a:bodyPr>
-          <a:lstStyle/>
-          <a:p>
-            <a:r>
-              <a:rPr lang="es-ES" sz="2800" dirty="0"/>
-              <a:t>Masa =/= 0</a:t>
-            </a:r>
-          </a:p>
-        </p:txBody>
-      </p:sp>
-    </p:spTree>
-    <p:extLst>
-      <p:ext uri="{BB962C8B-B14F-4D97-AF65-F5344CB8AC3E}">
-        <p14:creationId xmlns:p14="http://schemas.microsoft.com/office/powerpoint/2010/main" val="1417451393"/>
-      </p:ext>
-    </p:extLst>
-  </p:cSld>
-  <p:clrMapOvr>
-    <a:masterClrMapping/>
-  </p:clrMapOvr>
-</p:sld>
-</file>
-
-<file path=ppt/slides/slide20.xml><?xml version="1.0" encoding="utf-8"?>
-<p:sld xmlns:a="http://schemas.openxmlformats.org/drawingml/2006/main" xmlns:r="http://schemas.openxmlformats.org/officeDocument/2006/relationships" xmlns:p="http://schemas.openxmlformats.org/presentationml/2006/main">
-  <p:cSld>
-    <p:spTree>
-      <p:nvGrpSpPr>
-        <p:cNvPr id="1" name=""/>
-        <p:cNvGrpSpPr/>
-        <p:nvPr/>
-      </p:nvGrpSpPr>
-      <p:grpSpPr>
-        <a:xfrm>
-          <a:off x="0" y="0"/>
-          <a:ext cx="0" cy="0"/>
-          <a:chOff x="0" y="0"/>
-          <a:chExt cx="0" cy="0"/>
-        </a:xfrm>
-      </p:grpSpPr>
-      <p:sp>
-        <p:nvSpPr>
-          <p:cNvPr id="2" name="Título 1">
-            <a:extLst>
-              <a:ext uri="{FF2B5EF4-FFF2-40B4-BE49-F238E27FC236}">
-                <a16:creationId xmlns:a16="http://schemas.microsoft.com/office/drawing/2014/main" id="{7D273FCD-D6B3-B12D-35D8-963ADA838D04}"/>
-              </a:ext>
-            </a:extLst>
-          </p:cNvPr>
-          <p:cNvSpPr>
-            <a:spLocks noGrp="1"/>
-          </p:cNvSpPr>
-          <p:nvPr>
-            <p:ph type="title"/>
-          </p:nvPr>
-        </p:nvSpPr>
-        <p:spPr>
-          <a:xfrm>
-            <a:off x="1175425" y="32426"/>
-            <a:ext cx="9369357" cy="738669"/>
-          </a:xfrm>
-        </p:spPr>
-        <p:txBody>
-          <a:bodyPr>
-            <a:normAutofit/>
-          </a:bodyPr>
-          <a:lstStyle/>
-          <a:p>
-            <a:pPr algn="ctr"/>
-            <a:r>
-              <a:rPr lang="es-ES" sz="3200" dirty="0"/>
-              <a:t>Comparación</a:t>
-            </a:r>
-          </a:p>
-        </p:txBody>
-      </p:sp>
       <p:pic>
         <p:nvPicPr>
-          <p:cNvPr id="4" name="Imagen 3" descr="Gráfico&#10;&#10;Descripción generada automáticamente">
-            <a:extLst>
-              <a:ext uri="{FF2B5EF4-FFF2-40B4-BE49-F238E27FC236}">
-                <a16:creationId xmlns:a16="http://schemas.microsoft.com/office/drawing/2014/main" id="{5BAE1880-E8D3-FCAA-137B-27A86AE7B008}"/>
+          <p:cNvPr id="3" name="Imagen 2" descr="Gráfico, Gráfico de líneas&#10;&#10;Descripción generada automáticamente">
+            <a:extLst>
+              <a:ext uri="{FF2B5EF4-FFF2-40B4-BE49-F238E27FC236}">
+                <a16:creationId xmlns:a16="http://schemas.microsoft.com/office/drawing/2014/main" id="{9E6CF410-5ED8-C178-5E3A-4D7A28B047D6}"/>
               </a:ext>
             </a:extLst>
           </p:cNvPr>
@@ -4769,7 +4059,7 @@
           <p:nvPr/>
         </p:nvPicPr>
         <p:blipFill>
-          <a:blip r:embed="rId2">
+          <a:blip r:embed="rId3">
             <a:extLst>
               <a:ext uri="{28A0092B-C50C-407E-A947-70E740481C1C}">
                 <a14:useLocalDpi xmlns:a14="http://schemas.microsoft.com/office/drawing/2010/main" val="0"/>
@@ -4782,8 +4072,8 @@
         </p:blipFill>
         <p:spPr>
           <a:xfrm>
-            <a:off x="2226417" y="623410"/>
-            <a:ext cx="7267372" cy="6041550"/>
+            <a:off x="6096000" y="1512657"/>
+            <a:ext cx="4941314" cy="3832686"/>
           </a:xfrm>
           <a:prstGeom prst="rect">
             <a:avLst/>
@@ -4793,7 +4083,7 @@
     </p:spTree>
     <p:extLst>
       <p:ext uri="{BB962C8B-B14F-4D97-AF65-F5344CB8AC3E}">
-        <p14:creationId xmlns:p14="http://schemas.microsoft.com/office/powerpoint/2010/main" val="4037393224"/>
+        <p14:creationId xmlns:p14="http://schemas.microsoft.com/office/powerpoint/2010/main" val="925384807"/>
       </p:ext>
     </p:extLst>
   </p:cSld>
@@ -4884,8 +4174,8 @@
         </p:blipFill>
         <p:spPr>
           <a:xfrm>
-            <a:off x="743241" y="1418976"/>
-            <a:ext cx="3369998" cy="3816848"/>
+            <a:off x="1474422" y="2089194"/>
+            <a:ext cx="2365901" cy="2679611"/>
           </a:xfrm>
           <a:prstGeom prst="rect">
             <a:avLst/>
@@ -4906,8 +4196,8 @@
         </p:nvSpPr>
         <p:spPr>
           <a:xfrm>
-            <a:off x="4991423" y="1418976"/>
-            <a:ext cx="2448560" cy="523220"/>
+            <a:off x="4921734" y="1838437"/>
+            <a:ext cx="1876737" cy="523220"/>
           </a:xfrm>
           <a:prstGeom prst="rect">
             <a:avLst/>
@@ -4927,12 +4217,82 @@
           </a:p>
         </p:txBody>
       </p:sp>
+      <p:sp>
+        <p:nvSpPr>
+          <p:cNvPr id="4" name="CuadroTexto 3">
+            <a:extLst>
+              <a:ext uri="{FF2B5EF4-FFF2-40B4-BE49-F238E27FC236}">
+                <a16:creationId xmlns:a16="http://schemas.microsoft.com/office/drawing/2014/main" id="{53F59F97-C2CB-B2C8-E05B-712FAD741FD8}"/>
+              </a:ext>
+            </a:extLst>
+          </p:cNvPr>
+          <p:cNvSpPr txBox="1"/>
+          <p:nvPr/>
+        </p:nvSpPr>
+        <p:spPr>
+          <a:xfrm>
+            <a:off x="4971103" y="3973124"/>
+            <a:ext cx="1561777" cy="523220"/>
+          </a:xfrm>
+          <a:prstGeom prst="rect">
+            <a:avLst/>
+          </a:prstGeom>
+          <a:noFill/>
+        </p:spPr>
+        <p:txBody>
+          <a:bodyPr wrap="square" rtlCol="0">
+            <a:spAutoFit/>
+          </a:bodyPr>
+          <a:lstStyle/>
+          <a:p>
+            <a:r>
+              <a:rPr lang="es-ES" sz="2800" dirty="0"/>
+              <a:t>Masa = 0</a:t>
+            </a:r>
+          </a:p>
+        </p:txBody>
+      </p:sp>
+      <p:sp>
+        <p:nvSpPr>
+          <p:cNvPr id="5" name="CuadroTexto 4">
+            <a:extLst>
+              <a:ext uri="{FF2B5EF4-FFF2-40B4-BE49-F238E27FC236}">
+                <a16:creationId xmlns:a16="http://schemas.microsoft.com/office/drawing/2014/main" id="{835B904A-6559-67C3-781A-9EF3FB71DC4E}"/>
+              </a:ext>
+            </a:extLst>
+          </p:cNvPr>
+          <p:cNvSpPr txBox="1"/>
+          <p:nvPr/>
+        </p:nvSpPr>
+        <p:spPr>
+          <a:xfrm>
+            <a:off x="5004774" y="4974214"/>
+            <a:ext cx="1807048" cy="523220"/>
+          </a:xfrm>
+          <a:prstGeom prst="rect">
+            <a:avLst/>
+          </a:prstGeom>
+          <a:noFill/>
+        </p:spPr>
+        <p:txBody>
+          <a:bodyPr wrap="square" rtlCol="0">
+            <a:spAutoFit/>
+          </a:bodyPr>
+          <a:lstStyle/>
+          <a:p>
+            <a:r>
+              <a:rPr lang="es-ES" sz="2800" dirty="0"/>
+              <a:t>Masa ~= 0</a:t>
+            </a:r>
+          </a:p>
+        </p:txBody>
+      </p:sp>
       <p:pic>
         <p:nvPicPr>
-          <p:cNvPr id="7" name="Imagen 6" descr="Gráfico&#10;&#10;Descripción generada automáticamente">
-            <a:extLst>
-              <a:ext uri="{FF2B5EF4-FFF2-40B4-BE49-F238E27FC236}">
-                <a16:creationId xmlns:a16="http://schemas.microsoft.com/office/drawing/2014/main" id="{33F015FC-0F1B-C1E5-3F0D-D6ECC0446875}"/>
+          <p:cNvPr id="6" name="Imagen 5" descr="Gráfico&#10;&#10;Descripción generada automáticamente">
+            <a:extLst>
+              <a:ext uri="{FF2B5EF4-FFF2-40B4-BE49-F238E27FC236}">
+                <a16:creationId xmlns:a16="http://schemas.microsoft.com/office/drawing/2014/main" id="{AFD434B3-D9DD-A790-CD9E-CE0793D210FF}"/>
               </a:ext>
             </a:extLst>
           </p:cNvPr>
@@ -4955,8 +4315,44 @@
         </p:blipFill>
         <p:spPr>
           <a:xfrm>
-            <a:off x="5034926" y="2204552"/>
-            <a:ext cx="4541914" cy="3871295"/>
+            <a:off x="7703357" y="1024334"/>
+            <a:ext cx="2524114" cy="2151426"/>
+          </a:xfrm>
+          <a:prstGeom prst="rect">
+            <a:avLst/>
+          </a:prstGeom>
+        </p:spPr>
+      </p:pic>
+      <p:pic>
+        <p:nvPicPr>
+          <p:cNvPr id="7" name="Imagen 6" descr="Gráfico, Gráfico de líneas&#10;&#10;Descripción generada automáticamente">
+            <a:extLst>
+              <a:ext uri="{FF2B5EF4-FFF2-40B4-BE49-F238E27FC236}">
+                <a16:creationId xmlns:a16="http://schemas.microsoft.com/office/drawing/2014/main" id="{01B73FE7-C139-2201-E536-33143A1E49FB}"/>
+              </a:ext>
+            </a:extLst>
+          </p:cNvPr>
+          <p:cNvPicPr>
+            <a:picLocks noChangeAspect="1"/>
+          </p:cNvPicPr>
+          <p:nvPr/>
+        </p:nvPicPr>
+        <p:blipFill>
+          <a:blip r:embed="rId4">
+            <a:extLst>
+              <a:ext uri="{28A0092B-C50C-407E-A947-70E740481C1C}">
+                <a14:useLocalDpi xmlns:a14="http://schemas.microsoft.com/office/drawing/2010/main" val="0"/>
+              </a:ext>
+            </a:extLst>
+          </a:blip>
+          <a:stretch>
+            <a:fillRect/>
+          </a:stretch>
+        </p:blipFill>
+        <p:spPr>
+          <a:xfrm>
+            <a:off x="7703357" y="3563309"/>
+            <a:ext cx="2659057" cy="2270357"/>
           </a:xfrm>
           <a:prstGeom prst="rect">
             <a:avLst/>
@@ -4966,7 +4362,7 @@
     </p:spTree>
     <p:extLst>
       <p:ext uri="{BB962C8B-B14F-4D97-AF65-F5344CB8AC3E}">
-        <p14:creationId xmlns:p14="http://schemas.microsoft.com/office/powerpoint/2010/main" val="1825173172"/>
+        <p14:creationId xmlns:p14="http://schemas.microsoft.com/office/powerpoint/2010/main" val="3875425338"/>
       </p:ext>
     </p:extLst>
   </p:cSld>
@@ -5024,17 +4420,17 @@
             <a:pPr algn="ctr"/>
             <a:r>
               <a:rPr lang="es-ES" sz="3200" dirty="0"/>
-              <a:t>Modelado</a:t>
+              <a:t>Respuesta teórica despreciando efecto de la masa</a:t>
             </a:r>
           </a:p>
         </p:txBody>
       </p:sp>
       <p:pic>
         <p:nvPicPr>
-          <p:cNvPr id="11" name="Imagen 10" descr="Diagrama, Dibujo de ingeniería&#10;&#10;Descripción generada automáticamente">
-            <a:extLst>
-              <a:ext uri="{FF2B5EF4-FFF2-40B4-BE49-F238E27FC236}">
-                <a16:creationId xmlns:a16="http://schemas.microsoft.com/office/drawing/2014/main" id="{82CF72D6-9207-92BB-A7C4-60D849803868}"/>
+          <p:cNvPr id="7" name="Imagen 6" descr="Gráfico, Gráfico de líneas&#10;&#10;Descripción generada automáticamente">
+            <a:extLst>
+              <a:ext uri="{FF2B5EF4-FFF2-40B4-BE49-F238E27FC236}">
+                <a16:creationId xmlns:a16="http://schemas.microsoft.com/office/drawing/2014/main" id="{E9072E52-27B1-C035-7F68-2B1BB1E2A51A}"/>
               </a:ext>
             </a:extLst>
           </p:cNvPr>
@@ -5057,53 +4453,18 @@
         </p:blipFill>
         <p:spPr>
           <a:xfrm>
-            <a:off x="743241" y="1418976"/>
-            <a:ext cx="3369998" cy="3816848"/>
+            <a:off x="2775541" y="822988"/>
+            <a:ext cx="6169123" cy="5212024"/>
           </a:xfrm>
           <a:prstGeom prst="rect">
             <a:avLst/>
           </a:prstGeom>
         </p:spPr>
       </p:pic>
-      <p:sp>
-        <p:nvSpPr>
-          <p:cNvPr id="3" name="CuadroTexto 2">
-            <a:extLst>
-              <a:ext uri="{FF2B5EF4-FFF2-40B4-BE49-F238E27FC236}">
-                <a16:creationId xmlns:a16="http://schemas.microsoft.com/office/drawing/2014/main" id="{04CF3B9D-6584-BD86-4682-AF1EAE3D5AA2}"/>
-              </a:ext>
-            </a:extLst>
-          </p:cNvPr>
-          <p:cNvSpPr txBox="1"/>
-          <p:nvPr/>
-        </p:nvSpPr>
-        <p:spPr>
-          <a:xfrm>
-            <a:off x="4991423" y="1418976"/>
-            <a:ext cx="2448560" cy="523220"/>
-          </a:xfrm>
-          <a:prstGeom prst="rect">
-            <a:avLst/>
-          </a:prstGeom>
-          <a:noFill/>
-        </p:spPr>
-        <p:txBody>
-          <a:bodyPr wrap="square" rtlCol="0">
-            <a:spAutoFit/>
-          </a:bodyPr>
-          <a:lstStyle/>
-          <a:p>
-            <a:r>
-              <a:rPr lang="es-ES" sz="2800" dirty="0"/>
-              <a:t>Masa = 0</a:t>
-            </a:r>
-          </a:p>
-        </p:txBody>
-      </p:sp>
     </p:spTree>
     <p:extLst>
       <p:ext uri="{BB962C8B-B14F-4D97-AF65-F5344CB8AC3E}">
-        <p14:creationId xmlns:p14="http://schemas.microsoft.com/office/powerpoint/2010/main" val="297775590"/>
+        <p14:creationId xmlns:p14="http://schemas.microsoft.com/office/powerpoint/2010/main" val="2286750182"/>
       </p:ext>
     </p:extLst>
   </p:cSld>
@@ -5161,17 +4522,17 @@
             <a:pPr algn="ctr"/>
             <a:r>
               <a:rPr lang="es-ES" sz="3200" dirty="0"/>
-              <a:t>Modelado</a:t>
+              <a:t>Forma deseada para diseño de controlador</a:t>
             </a:r>
           </a:p>
         </p:txBody>
       </p:sp>
       <p:pic>
         <p:nvPicPr>
-          <p:cNvPr id="11" name="Imagen 10" descr="Diagrama, Dibujo de ingeniería&#10;&#10;Descripción generada automáticamente">
-            <a:extLst>
-              <a:ext uri="{FF2B5EF4-FFF2-40B4-BE49-F238E27FC236}">
-                <a16:creationId xmlns:a16="http://schemas.microsoft.com/office/drawing/2014/main" id="{82CF72D6-9207-92BB-A7C4-60D849803868}"/>
+          <p:cNvPr id="5" name="Imagen 4" descr="Diagrama&#10;&#10;Descripción generada automáticamente">
+            <a:extLst>
+              <a:ext uri="{FF2B5EF4-FFF2-40B4-BE49-F238E27FC236}">
+                <a16:creationId xmlns:a16="http://schemas.microsoft.com/office/drawing/2014/main" id="{5B8B2437-4EAF-7513-E006-8D6A7D154F18}"/>
               </a:ext>
             </a:extLst>
           </p:cNvPr>
@@ -5194,55 +4555,20 @@
         </p:blipFill>
         <p:spPr>
           <a:xfrm>
-            <a:off x="743241" y="1418976"/>
-            <a:ext cx="3369998" cy="3816848"/>
+            <a:off x="434663" y="663505"/>
+            <a:ext cx="5320784" cy="5530989"/>
           </a:xfrm>
           <a:prstGeom prst="rect">
             <a:avLst/>
           </a:prstGeom>
         </p:spPr>
       </p:pic>
-      <p:sp>
-        <p:nvSpPr>
-          <p:cNvPr id="3" name="CuadroTexto 2">
-            <a:extLst>
-              <a:ext uri="{FF2B5EF4-FFF2-40B4-BE49-F238E27FC236}">
-                <a16:creationId xmlns:a16="http://schemas.microsoft.com/office/drawing/2014/main" id="{04CF3B9D-6584-BD86-4682-AF1EAE3D5AA2}"/>
-              </a:ext>
-            </a:extLst>
-          </p:cNvPr>
-          <p:cNvSpPr txBox="1"/>
-          <p:nvPr/>
-        </p:nvSpPr>
-        <p:spPr>
-          <a:xfrm>
-            <a:off x="4991423" y="1418976"/>
-            <a:ext cx="2448560" cy="523220"/>
-          </a:xfrm>
-          <a:prstGeom prst="rect">
-            <a:avLst/>
-          </a:prstGeom>
-          <a:noFill/>
-        </p:spPr>
-        <p:txBody>
-          <a:bodyPr wrap="square" rtlCol="0">
-            <a:spAutoFit/>
-          </a:bodyPr>
-          <a:lstStyle/>
-          <a:p>
-            <a:r>
-              <a:rPr lang="es-ES" sz="2800" dirty="0"/>
-              <a:t>Masa = 0</a:t>
-            </a:r>
-          </a:p>
-        </p:txBody>
-      </p:sp>
       <p:pic>
         <p:nvPicPr>
           <p:cNvPr id="6" name="Imagen 5" descr="Gráfico, Gráfico de líneas&#10;&#10;Descripción generada automáticamente">
             <a:extLst>
               <a:ext uri="{FF2B5EF4-FFF2-40B4-BE49-F238E27FC236}">
-                <a16:creationId xmlns:a16="http://schemas.microsoft.com/office/drawing/2014/main" id="{A408521F-0720-9598-48BF-CD732F1F7FF2}"/>
+                <a16:creationId xmlns:a16="http://schemas.microsoft.com/office/drawing/2014/main" id="{53E0879C-51DE-0797-840B-E3BC0F17DFC4}"/>
               </a:ext>
             </a:extLst>
           </p:cNvPr>
@@ -5265,8 +4591,8 @@
         </p:blipFill>
         <p:spPr>
           <a:xfrm>
-            <a:off x="5146164" y="1942196"/>
-            <a:ext cx="4952876" cy="4228866"/>
+            <a:off x="5673731" y="1036669"/>
+            <a:ext cx="6307363" cy="4892250"/>
           </a:xfrm>
           <a:prstGeom prst="rect">
             <a:avLst/>
@@ -5276,7 +4602,7 @@
     </p:spTree>
     <p:extLst>
       <p:ext uri="{BB962C8B-B14F-4D97-AF65-F5344CB8AC3E}">
-        <p14:creationId xmlns:p14="http://schemas.microsoft.com/office/powerpoint/2010/main" val="332545366"/>
+        <p14:creationId xmlns:p14="http://schemas.microsoft.com/office/powerpoint/2010/main" val="1345154346"/>
       </p:ext>
     </p:extLst>
   </p:cSld>
@@ -5334,17 +4660,17 @@
             <a:pPr algn="ctr"/>
             <a:r>
               <a:rPr lang="es-ES" sz="3200" dirty="0"/>
-              <a:t>Modelado</a:t>
+              <a:t>Realimentación unitaria de la planta</a:t>
             </a:r>
           </a:p>
         </p:txBody>
       </p:sp>
       <p:pic>
         <p:nvPicPr>
-          <p:cNvPr id="11" name="Imagen 10" descr="Diagrama, Dibujo de ingeniería&#10;&#10;Descripción generada automáticamente">
-            <a:extLst>
-              <a:ext uri="{FF2B5EF4-FFF2-40B4-BE49-F238E27FC236}">
-                <a16:creationId xmlns:a16="http://schemas.microsoft.com/office/drawing/2014/main" id="{82CF72D6-9207-92BB-A7C4-60D849803868}"/>
+          <p:cNvPr id="7" name="Imagen 6" descr="Diagrama&#10;&#10;Descripción generada automáticamente">
+            <a:extLst>
+              <a:ext uri="{FF2B5EF4-FFF2-40B4-BE49-F238E27FC236}">
+                <a16:creationId xmlns:a16="http://schemas.microsoft.com/office/drawing/2014/main" id="{CCBEC644-2EA5-6B96-69CB-D2C04F7AE38E}"/>
               </a:ext>
             </a:extLst>
           </p:cNvPr>
@@ -5367,53 +4693,18 @@
         </p:blipFill>
         <p:spPr>
           <a:xfrm>
-            <a:off x="743241" y="1418976"/>
-            <a:ext cx="3369998" cy="3816848"/>
+            <a:off x="487537" y="1376680"/>
+            <a:ext cx="10745132" cy="4104640"/>
           </a:xfrm>
           <a:prstGeom prst="rect">
             <a:avLst/>
           </a:prstGeom>
         </p:spPr>
       </p:pic>
-      <p:sp>
-        <p:nvSpPr>
-          <p:cNvPr id="3" name="CuadroTexto 2">
-            <a:extLst>
-              <a:ext uri="{FF2B5EF4-FFF2-40B4-BE49-F238E27FC236}">
-                <a16:creationId xmlns:a16="http://schemas.microsoft.com/office/drawing/2014/main" id="{04CF3B9D-6584-BD86-4682-AF1EAE3D5AA2}"/>
-              </a:ext>
-            </a:extLst>
-          </p:cNvPr>
-          <p:cNvSpPr txBox="1"/>
-          <p:nvPr/>
-        </p:nvSpPr>
-        <p:spPr>
-          <a:xfrm>
-            <a:off x="4991423" y="1418976"/>
-            <a:ext cx="2448560" cy="523220"/>
-          </a:xfrm>
-          <a:prstGeom prst="rect">
-            <a:avLst/>
-          </a:prstGeom>
-          <a:noFill/>
-        </p:spPr>
-        <p:txBody>
-          <a:bodyPr wrap="square" rtlCol="0">
-            <a:spAutoFit/>
-          </a:bodyPr>
-          <a:lstStyle/>
-          <a:p>
-            <a:r>
-              <a:rPr lang="es-ES" sz="2800" dirty="0"/>
-              <a:t>Masa ~= 0</a:t>
-            </a:r>
-          </a:p>
-        </p:txBody>
-      </p:sp>
     </p:spTree>
     <p:extLst>
       <p:ext uri="{BB962C8B-B14F-4D97-AF65-F5344CB8AC3E}">
-        <p14:creationId xmlns:p14="http://schemas.microsoft.com/office/powerpoint/2010/main" val="3960632973"/>
+        <p14:creationId xmlns:p14="http://schemas.microsoft.com/office/powerpoint/2010/main" val="3520975447"/>
       </p:ext>
     </p:extLst>
   </p:cSld>
@@ -5464,24 +4755,24 @@
         </p:spPr>
         <p:txBody>
           <a:bodyPr>
-            <a:normAutofit/>
+            <a:normAutofit fontScale="90000"/>
           </a:bodyPr>
           <a:lstStyle/>
           <a:p>
             <a:pPr algn="ctr"/>
             <a:r>
               <a:rPr lang="es-ES" sz="3200" dirty="0"/>
-              <a:t>Modelado</a:t>
+              <a:t>Respuesta teórica de la planta realimentada unitariamente</a:t>
             </a:r>
           </a:p>
         </p:txBody>
       </p:sp>
       <p:pic>
         <p:nvPicPr>
-          <p:cNvPr id="11" name="Imagen 10" descr="Diagrama, Dibujo de ingeniería&#10;&#10;Descripción generada automáticamente">
-            <a:extLst>
-              <a:ext uri="{FF2B5EF4-FFF2-40B4-BE49-F238E27FC236}">
-                <a16:creationId xmlns:a16="http://schemas.microsoft.com/office/drawing/2014/main" id="{82CF72D6-9207-92BB-A7C4-60D849803868}"/>
+          <p:cNvPr id="7" name="Imagen 6" descr="Gráfico&#10;&#10;Descripción generada automáticamente">
+            <a:extLst>
+              <a:ext uri="{FF2B5EF4-FFF2-40B4-BE49-F238E27FC236}">
+                <a16:creationId xmlns:a16="http://schemas.microsoft.com/office/drawing/2014/main" id="{94E3D367-D165-5636-DE1E-1BA362B0CE20}"/>
               </a:ext>
             </a:extLst>
           </p:cNvPr>
@@ -5504,79 +4795,8 @@
         </p:blipFill>
         <p:spPr>
           <a:xfrm>
-            <a:off x="743241" y="1418976"/>
-            <a:ext cx="3369998" cy="3816848"/>
-          </a:xfrm>
-          <a:prstGeom prst="rect">
-            <a:avLst/>
-          </a:prstGeom>
-        </p:spPr>
-      </p:pic>
-      <p:sp>
-        <p:nvSpPr>
-          <p:cNvPr id="3" name="CuadroTexto 2">
-            <a:extLst>
-              <a:ext uri="{FF2B5EF4-FFF2-40B4-BE49-F238E27FC236}">
-                <a16:creationId xmlns:a16="http://schemas.microsoft.com/office/drawing/2014/main" id="{04CF3B9D-6584-BD86-4682-AF1EAE3D5AA2}"/>
-              </a:ext>
-            </a:extLst>
-          </p:cNvPr>
-          <p:cNvSpPr txBox="1"/>
-          <p:nvPr/>
-        </p:nvSpPr>
-        <p:spPr>
-          <a:xfrm>
-            <a:off x="4991423" y="1418976"/>
-            <a:ext cx="2448560" cy="523220"/>
-          </a:xfrm>
-          <a:prstGeom prst="rect">
-            <a:avLst/>
-          </a:prstGeom>
-          <a:noFill/>
-        </p:spPr>
-        <p:txBody>
-          <a:bodyPr wrap="square" rtlCol="0">
-            <a:spAutoFit/>
-          </a:bodyPr>
-          <a:lstStyle/>
-          <a:p>
-            <a:r>
-              <a:rPr lang="es-ES" sz="2800" dirty="0"/>
-              <a:t>Masa ~= 0</a:t>
-            </a:r>
-          </a:p>
-        </p:txBody>
-      </p:sp>
-      <p:pic>
-        <p:nvPicPr>
-          <p:cNvPr id="6" name="Imagen 5" descr="Gráfico, Gráfico de líneas&#10;&#10;Descripción generada automáticamente">
-            <a:extLst>
-              <a:ext uri="{FF2B5EF4-FFF2-40B4-BE49-F238E27FC236}">
-                <a16:creationId xmlns:a16="http://schemas.microsoft.com/office/drawing/2014/main" id="{A408521F-0720-9598-48BF-CD732F1F7FF2}"/>
-              </a:ext>
-            </a:extLst>
-          </p:cNvPr>
-          <p:cNvPicPr>
-            <a:picLocks noChangeAspect="1"/>
-          </p:cNvPicPr>
-          <p:nvPr/>
-        </p:nvPicPr>
-        <p:blipFill>
-          <a:blip r:embed="rId3">
-            <a:extLst>
-              <a:ext uri="{28A0092B-C50C-407E-A947-70E740481C1C}">
-                <a14:useLocalDpi xmlns:a14="http://schemas.microsoft.com/office/drawing/2010/main" val="0"/>
-              </a:ext>
-            </a:extLst>
-          </a:blip>
-          <a:stretch>
-            <a:fillRect/>
-          </a:stretch>
-        </p:blipFill>
-        <p:spPr>
-          <a:xfrm>
-            <a:off x="5146164" y="1942196"/>
-            <a:ext cx="4952876" cy="4228866"/>
+            <a:off x="2392903" y="771095"/>
+            <a:ext cx="6934400" cy="5809282"/>
           </a:xfrm>
           <a:prstGeom prst="rect">
             <a:avLst/>
@@ -5586,7 +4806,7 @@
     </p:spTree>
     <p:extLst>
       <p:ext uri="{BB962C8B-B14F-4D97-AF65-F5344CB8AC3E}">
-        <p14:creationId xmlns:p14="http://schemas.microsoft.com/office/powerpoint/2010/main" val="2247263062"/>
+        <p14:creationId xmlns:p14="http://schemas.microsoft.com/office/powerpoint/2010/main" val="1487218276"/>
       </p:ext>
     </p:extLst>
   </p:cSld>
@@ -5644,17 +4864,17 @@
             <a:pPr algn="ctr"/>
             <a:r>
               <a:rPr lang="es-ES" sz="3200" dirty="0"/>
-              <a:t>Modelado</a:t>
+              <a:t>Identificación empírica</a:t>
             </a:r>
           </a:p>
         </p:txBody>
       </p:sp>
       <p:pic>
         <p:nvPicPr>
-          <p:cNvPr id="11" name="Imagen 10" descr="Diagrama, Dibujo de ingeniería&#10;&#10;Descripción generada automáticamente">
-            <a:extLst>
-              <a:ext uri="{FF2B5EF4-FFF2-40B4-BE49-F238E27FC236}">
-                <a16:creationId xmlns:a16="http://schemas.microsoft.com/office/drawing/2014/main" id="{82CF72D6-9207-92BB-A7C4-60D849803868}"/>
+          <p:cNvPr id="6" name="Imagen 5" descr="Gráfico&#10;&#10;Descripción generada automáticamente">
+            <a:extLst>
+              <a:ext uri="{FF2B5EF4-FFF2-40B4-BE49-F238E27FC236}">
+                <a16:creationId xmlns:a16="http://schemas.microsoft.com/office/drawing/2014/main" id="{517CA969-39FE-5ECD-625C-1A665CABC9EF}"/>
               </a:ext>
             </a:extLst>
           </p:cNvPr>
@@ -5677,185 +4897,8 @@
         </p:blipFill>
         <p:spPr>
           <a:xfrm>
-            <a:off x="743241" y="1418976"/>
-            <a:ext cx="3369998" cy="3816848"/>
-          </a:xfrm>
-          <a:prstGeom prst="rect">
-            <a:avLst/>
-          </a:prstGeom>
-        </p:spPr>
-      </p:pic>
-      <p:sp>
-        <p:nvSpPr>
-          <p:cNvPr id="3" name="CuadroTexto 2">
-            <a:extLst>
-              <a:ext uri="{FF2B5EF4-FFF2-40B4-BE49-F238E27FC236}">
-                <a16:creationId xmlns:a16="http://schemas.microsoft.com/office/drawing/2014/main" id="{04CF3B9D-6584-BD86-4682-AF1EAE3D5AA2}"/>
-              </a:ext>
-            </a:extLst>
-          </p:cNvPr>
-          <p:cNvSpPr txBox="1"/>
-          <p:nvPr/>
-        </p:nvSpPr>
-        <p:spPr>
-          <a:xfrm>
-            <a:off x="4921734" y="1838437"/>
-            <a:ext cx="1876737" cy="523220"/>
-          </a:xfrm>
-          <a:prstGeom prst="rect">
-            <a:avLst/>
-          </a:prstGeom>
-          <a:noFill/>
-        </p:spPr>
-        <p:txBody>
-          <a:bodyPr wrap="square" rtlCol="0">
-            <a:spAutoFit/>
-          </a:bodyPr>
-          <a:lstStyle/>
-          <a:p>
-            <a:r>
-              <a:rPr lang="es-ES" sz="2800" dirty="0"/>
-              <a:t>Masa =/= 0</a:t>
-            </a:r>
-          </a:p>
-        </p:txBody>
-      </p:sp>
-      <p:sp>
-        <p:nvSpPr>
-          <p:cNvPr id="4" name="CuadroTexto 3">
-            <a:extLst>
-              <a:ext uri="{FF2B5EF4-FFF2-40B4-BE49-F238E27FC236}">
-                <a16:creationId xmlns:a16="http://schemas.microsoft.com/office/drawing/2014/main" id="{53F59F97-C2CB-B2C8-E05B-712FAD741FD8}"/>
-              </a:ext>
-            </a:extLst>
-          </p:cNvPr>
-          <p:cNvSpPr txBox="1"/>
-          <p:nvPr/>
-        </p:nvSpPr>
-        <p:spPr>
-          <a:xfrm>
-            <a:off x="4971103" y="3973124"/>
-            <a:ext cx="1561777" cy="523220"/>
-          </a:xfrm>
-          <a:prstGeom prst="rect">
-            <a:avLst/>
-          </a:prstGeom>
-          <a:noFill/>
-        </p:spPr>
-        <p:txBody>
-          <a:bodyPr wrap="square" rtlCol="0">
-            <a:spAutoFit/>
-          </a:bodyPr>
-          <a:lstStyle/>
-          <a:p>
-            <a:r>
-              <a:rPr lang="es-ES" sz="2800" dirty="0"/>
-              <a:t>Masa = 0</a:t>
-            </a:r>
-          </a:p>
-        </p:txBody>
-      </p:sp>
-      <p:sp>
-        <p:nvSpPr>
-          <p:cNvPr id="5" name="CuadroTexto 4">
-            <a:extLst>
-              <a:ext uri="{FF2B5EF4-FFF2-40B4-BE49-F238E27FC236}">
-                <a16:creationId xmlns:a16="http://schemas.microsoft.com/office/drawing/2014/main" id="{835B904A-6559-67C3-781A-9EF3FB71DC4E}"/>
-              </a:ext>
-            </a:extLst>
-          </p:cNvPr>
-          <p:cNvSpPr txBox="1"/>
-          <p:nvPr/>
-        </p:nvSpPr>
-        <p:spPr>
-          <a:xfrm>
-            <a:off x="5004774" y="4974214"/>
-            <a:ext cx="1807048" cy="523220"/>
-          </a:xfrm>
-          <a:prstGeom prst="rect">
-            <a:avLst/>
-          </a:prstGeom>
-          <a:noFill/>
-        </p:spPr>
-        <p:txBody>
-          <a:bodyPr wrap="square" rtlCol="0">
-            <a:spAutoFit/>
-          </a:bodyPr>
-          <a:lstStyle/>
-          <a:p>
-            <a:r>
-              <a:rPr lang="es-ES" sz="2800" dirty="0"/>
-              <a:t>Masa ~= 0</a:t>
-            </a:r>
-          </a:p>
-        </p:txBody>
-      </p:sp>
-      <p:pic>
-        <p:nvPicPr>
-          <p:cNvPr id="6" name="Imagen 5" descr="Gráfico&#10;&#10;Descripción generada automáticamente">
-            <a:extLst>
-              <a:ext uri="{FF2B5EF4-FFF2-40B4-BE49-F238E27FC236}">
-                <a16:creationId xmlns:a16="http://schemas.microsoft.com/office/drawing/2014/main" id="{AFD434B3-D9DD-A790-CD9E-CE0793D210FF}"/>
-              </a:ext>
-            </a:extLst>
-          </p:cNvPr>
-          <p:cNvPicPr>
-            <a:picLocks noChangeAspect="1"/>
-          </p:cNvPicPr>
-          <p:nvPr/>
-        </p:nvPicPr>
-        <p:blipFill>
-          <a:blip r:embed="rId3">
-            <a:extLst>
-              <a:ext uri="{28A0092B-C50C-407E-A947-70E740481C1C}">
-                <a14:useLocalDpi xmlns:a14="http://schemas.microsoft.com/office/drawing/2010/main" val="0"/>
-              </a:ext>
-            </a:extLst>
-          </a:blip>
-          <a:stretch>
-            <a:fillRect/>
-          </a:stretch>
-        </p:blipFill>
-        <p:spPr>
-          <a:xfrm>
-            <a:off x="7703357" y="1024334"/>
-            <a:ext cx="2524114" cy="2151426"/>
-          </a:xfrm>
-          <a:prstGeom prst="rect">
-            <a:avLst/>
-          </a:prstGeom>
-        </p:spPr>
-      </p:pic>
-      <p:pic>
-        <p:nvPicPr>
-          <p:cNvPr id="7" name="Imagen 6" descr="Gráfico, Gráfico de líneas&#10;&#10;Descripción generada automáticamente">
-            <a:extLst>
-              <a:ext uri="{FF2B5EF4-FFF2-40B4-BE49-F238E27FC236}">
-                <a16:creationId xmlns:a16="http://schemas.microsoft.com/office/drawing/2014/main" id="{01B73FE7-C139-2201-E536-33143A1E49FB}"/>
-              </a:ext>
-            </a:extLst>
-          </p:cNvPr>
-          <p:cNvPicPr>
-            <a:picLocks noChangeAspect="1"/>
-          </p:cNvPicPr>
-          <p:nvPr/>
-        </p:nvPicPr>
-        <p:blipFill>
-          <a:blip r:embed="rId4">
-            <a:extLst>
-              <a:ext uri="{28A0092B-C50C-407E-A947-70E740481C1C}">
-                <a14:useLocalDpi xmlns:a14="http://schemas.microsoft.com/office/drawing/2010/main" val="0"/>
-              </a:ext>
-            </a:extLst>
-          </a:blip>
-          <a:stretch>
-            <a:fillRect/>
-          </a:stretch>
-        </p:blipFill>
-        <p:spPr>
-          <a:xfrm>
-            <a:off x="7703357" y="3563309"/>
-            <a:ext cx="2659057" cy="2270357"/>
+            <a:off x="2788648" y="782053"/>
+            <a:ext cx="6614704" cy="5293893"/>
           </a:xfrm>
           <a:prstGeom prst="rect">
             <a:avLst/>
@@ -5865,7 +4908,7 @@
     </p:spTree>
     <p:extLst>
       <p:ext uri="{BB962C8B-B14F-4D97-AF65-F5344CB8AC3E}">
-        <p14:creationId xmlns:p14="http://schemas.microsoft.com/office/powerpoint/2010/main" val="3875425338"/>
+        <p14:creationId xmlns:p14="http://schemas.microsoft.com/office/powerpoint/2010/main" val="1003764746"/>
       </p:ext>
     </p:extLst>
   </p:cSld>
@@ -5923,17 +4966,17 @@
             <a:pPr algn="ctr"/>
             <a:r>
               <a:rPr lang="es-ES" sz="3200" dirty="0"/>
-              <a:t>Respuesta teórica de la planta</a:t>
+              <a:t>Identificación de parámetros</a:t>
             </a:r>
           </a:p>
         </p:txBody>
       </p:sp>
       <p:pic>
         <p:nvPicPr>
-          <p:cNvPr id="9" name="Imagen 8" descr="Gráfico&#10;&#10;Descripción generada automáticamente">
-            <a:extLst>
-              <a:ext uri="{FF2B5EF4-FFF2-40B4-BE49-F238E27FC236}">
-                <a16:creationId xmlns:a16="http://schemas.microsoft.com/office/drawing/2014/main" id="{C0808FB2-82B0-106A-EABE-3CCBDB94A97B}"/>
+          <p:cNvPr id="5" name="Imagen 4">
+            <a:extLst>
+              <a:ext uri="{FF2B5EF4-FFF2-40B4-BE49-F238E27FC236}">
+                <a16:creationId xmlns:a16="http://schemas.microsoft.com/office/drawing/2014/main" id="{20DA2E67-DF58-6873-A0BF-0511C5DFCE6F}"/>
               </a:ext>
             </a:extLst>
           </p:cNvPr>
@@ -5956,8 +4999,8 @@
         </p:blipFill>
         <p:spPr>
           <a:xfrm>
-            <a:off x="2662940" y="771095"/>
-            <a:ext cx="6866119" cy="5852328"/>
+            <a:off x="2680505" y="771095"/>
+            <a:ext cx="6830990" cy="5583884"/>
           </a:xfrm>
           <a:prstGeom prst="rect">
             <a:avLst/>
@@ -5967,7 +5010,7 @@
     </p:spTree>
     <p:extLst>
       <p:ext uri="{BB962C8B-B14F-4D97-AF65-F5344CB8AC3E}">
-        <p14:creationId xmlns:p14="http://schemas.microsoft.com/office/powerpoint/2010/main" val="925384807"/>
+        <p14:creationId xmlns:p14="http://schemas.microsoft.com/office/powerpoint/2010/main" val="3672870487"/>
       </p:ext>
     </p:extLst>
   </p:cSld>

</xml_diff>